<commit_message>
Crosstool arm for Allwiner SoC
</commit_message>
<xml_diff>
--- a/cr/CR_lundi_23_09_13.pptx
+++ b/cr/CR_lundi_23_09_13.pptx
@@ -34,7 +34,10 @@
     <p:sldId id="292" r:id="rId28"/>
     <p:sldId id="293" r:id="rId29"/>
     <p:sldId id="295" r:id="rId30"/>
-    <p:sldId id="296" r:id="rId31"/>
+    <p:sldId id="298" r:id="rId31"/>
+    <p:sldId id="299" r:id="rId32"/>
+    <p:sldId id="296" r:id="rId33"/>
+    <p:sldId id="297" r:id="rId34"/>
   </p:sldIdLst>
   <p:sldSz cx="9144000" cy="6858000" type="screen4x3"/>
   <p:notesSz cx="6858000" cy="9144000"/>
@@ -4802,7 +4805,7 @@
           <a:p>
             <a:fld id="{7A6B8A3B-B4A8-0B47-A7EB-81B6CDAFFFC7}" type="datetimeFigureOut">
               <a:rPr lang="fr-FR" smtClean="0"/>
-              <a:t>30/09/13</a:t>
+              <a:t>05/10/13</a:t>
             </a:fld>
             <a:endParaRPr lang="fr-FR"/>
           </a:p>
@@ -5176,7 +5179,7 @@
           <a:p>
             <a:fld id="{7A6B8A3B-B4A8-0B47-A7EB-81B6CDAFFFC7}" type="datetimeFigureOut">
               <a:rPr lang="fr-FR" smtClean="0"/>
-              <a:t>30/09/13</a:t>
+              <a:t>05/10/13</a:t>
             </a:fld>
             <a:endParaRPr lang="fr-FR"/>
           </a:p>
@@ -5553,7 +5556,7 @@
           <a:p>
             <a:fld id="{7A6B8A3B-B4A8-0B47-A7EB-81B6CDAFFFC7}" type="datetimeFigureOut">
               <a:rPr lang="fr-FR" smtClean="0"/>
-              <a:t>30/09/13</a:t>
+              <a:t>05/10/13</a:t>
             </a:fld>
             <a:endParaRPr lang="fr-FR"/>
           </a:p>
@@ -6062,7 +6065,7 @@
           <a:p>
             <a:fld id="{7A6B8A3B-B4A8-0B47-A7EB-81B6CDAFFFC7}" type="datetimeFigureOut">
               <a:rPr lang="fr-FR" smtClean="0"/>
-              <a:t>30/09/13</a:t>
+              <a:t>05/10/13</a:t>
             </a:fld>
             <a:endParaRPr lang="fr-FR"/>
           </a:p>
@@ -6303,7 +6306,7 @@
           <a:p>
             <a:fld id="{7A6B8A3B-B4A8-0B47-A7EB-81B6CDAFFFC7}" type="datetimeFigureOut">
               <a:rPr lang="fr-FR" smtClean="0"/>
-              <a:t>30/09/13</a:t>
+              <a:t>05/10/13</a:t>
             </a:fld>
             <a:endParaRPr lang="fr-FR"/>
           </a:p>
@@ -6534,7 +6537,7 @@
           <a:p>
             <a:fld id="{7A6B8A3B-B4A8-0B47-A7EB-81B6CDAFFFC7}" type="datetimeFigureOut">
               <a:rPr lang="fr-FR" smtClean="0"/>
-              <a:t>30/09/13</a:t>
+              <a:t>05/10/13</a:t>
             </a:fld>
             <a:endParaRPr lang="fr-FR"/>
           </a:p>
@@ -13890,7 +13893,7 @@
           <a:p>
             <a:fld id="{7A6B8A3B-B4A8-0B47-A7EB-81B6CDAFFFC7}" type="datetimeFigureOut">
               <a:rPr lang="fr-FR" smtClean="0"/>
-              <a:t>30/09/13</a:t>
+              <a:t>05/10/13</a:t>
             </a:fld>
             <a:endParaRPr lang="fr-FR"/>
           </a:p>
@@ -14427,7 +14430,7 @@
           <a:p>
             <a:fld id="{7A6B8A3B-B4A8-0B47-A7EB-81B6CDAFFFC7}" type="datetimeFigureOut">
               <a:rPr lang="fr-FR" smtClean="0"/>
-              <a:t>30/09/13</a:t>
+              <a:t>05/10/13</a:t>
             </a:fld>
             <a:endParaRPr lang="fr-FR"/>
           </a:p>
@@ -14602,7 +14605,7 @@
           <a:p>
             <a:fld id="{7A6B8A3B-B4A8-0B47-A7EB-81B6CDAFFFC7}" type="datetimeFigureOut">
               <a:rPr lang="fr-FR" smtClean="0"/>
-              <a:t>30/09/13</a:t>
+              <a:t>05/10/13</a:t>
             </a:fld>
             <a:endParaRPr lang="fr-FR"/>
           </a:p>
@@ -14692,7 +14695,7 @@
           <a:p>
             <a:fld id="{7A6B8A3B-B4A8-0B47-A7EB-81B6CDAFFFC7}" type="datetimeFigureOut">
               <a:rPr lang="fr-FR" smtClean="0"/>
-              <a:t>30/09/13</a:t>
+              <a:t>05/10/13</a:t>
             </a:fld>
             <a:endParaRPr lang="fr-FR"/>
           </a:p>
@@ -15028,7 +15031,7 @@
           <a:p>
             <a:fld id="{7A6B8A3B-B4A8-0B47-A7EB-81B6CDAFFFC7}" type="datetimeFigureOut">
               <a:rPr lang="fr-FR" smtClean="0"/>
-              <a:t>30/09/13</a:t>
+              <a:t>05/10/13</a:t>
             </a:fld>
             <a:endParaRPr lang="fr-FR"/>
           </a:p>
@@ -16448,7 +16451,7 @@
           <a:p>
             <a:fld id="{7A6B8A3B-B4A8-0B47-A7EB-81B6CDAFFFC7}" type="datetimeFigureOut">
               <a:rPr lang="fr-FR" smtClean="0"/>
-              <a:t>30/09/13</a:t>
+              <a:t>05/10/13</a:t>
             </a:fld>
             <a:endParaRPr lang="fr-FR"/>
           </a:p>
@@ -20137,17 +20140,8 @@
           <a:p>
             <a:r>
               <a:rPr lang="fr-FR" dirty="0" smtClean="0"/>
-              <a:t>Taux horaire : </a:t>
-            </a:r>
-            <a:r>
-              <a:rPr lang="fr-FR" dirty="0" smtClean="0"/>
-              <a:t>minimum (SMIC =  9,43 euros</a:t>
-            </a:r>
-            <a:r>
-              <a:rPr lang="fr-FR" dirty="0" smtClean="0"/>
-              <a:t>)</a:t>
-            </a:r>
-            <a:endParaRPr lang="fr-FR" dirty="0" smtClean="0"/>
+              <a:t>Taux horaire : minimum (SMIC =  9,43 euros)</a:t>
+            </a:r>
           </a:p>
           <a:p>
             <a:r>
@@ -20788,7 +20782,6 @@
               <a:rPr lang="fr-FR" dirty="0" smtClean="0"/>
               <a:t> : VOLER</a:t>
             </a:r>
-            <a:endParaRPr lang="fr-FR" dirty="0" smtClean="0"/>
           </a:p>
           <a:p>
             <a:pPr lvl="1"/>
@@ -21000,11 +20993,7 @@
             </a:r>
             <a:r>
               <a:rPr lang="fr-FR" dirty="0" smtClean="0"/>
-              <a:t> : Contr</a:t>
-            </a:r>
-            <a:r>
-              <a:rPr lang="fr-FR" dirty="0" smtClean="0"/>
-              <a:t>ôler le déplacement du Drone</a:t>
+              <a:t> : Contrôler le déplacement du Drone</a:t>
             </a:r>
           </a:p>
           <a:p>
@@ -21366,11 +21355,7 @@
             <a:pPr algn="ctr"/>
             <a:r>
               <a:rPr lang="fr-FR" dirty="0" smtClean="0"/>
-              <a:t>SPEC </a:t>
-            </a:r>
-            <a:r>
-              <a:rPr lang="fr-FR" dirty="0" smtClean="0"/>
-              <a:t>BASE SUITE</a:t>
+              <a:t>SPEC BASE SUITE</a:t>
             </a:r>
             <a:endParaRPr lang="fr-FR" dirty="0"/>
           </a:p>
@@ -21805,24 +21790,15 @@
           <a:p>
             <a:r>
               <a:rPr lang="fr-FR" dirty="0" smtClean="0"/>
-              <a:t>Gestion axe caméra (Vol immersif</a:t>
-            </a:r>
+              <a:t>Gestion axe caméra (Vol immersif)</a:t>
+            </a:r>
+          </a:p>
+          <a:p>
+            <a:pPr lvl="1"/>
             <a:r>
               <a:rPr lang="fr-FR" dirty="0" smtClean="0"/>
-              <a:t>)</a:t>
-            </a:r>
-          </a:p>
-          <a:p>
-            <a:pPr lvl="1"/>
-            <a:r>
-              <a:rPr lang="fr-FR" dirty="0" smtClean="0"/>
-              <a:t>A</a:t>
-            </a:r>
-            <a:r>
-              <a:rPr lang="fr-FR" dirty="0" smtClean="0"/>
-              <a:t>xe vertical</a:t>
-            </a:r>
-            <a:endParaRPr lang="fr-FR" dirty="0" smtClean="0"/>
+              <a:t>Axe vertical</a:t>
+            </a:r>
           </a:p>
           <a:p>
             <a:pPr marL="0" indent="0">
@@ -22262,11 +22238,7 @@
             </a:r>
             <a:r>
               <a:rPr lang="fr-FR" dirty="0" smtClean="0"/>
-              <a:t>tructure </a:t>
-            </a:r>
-            <a:r>
-              <a:rPr lang="fr-FR" dirty="0" smtClean="0"/>
-              <a:t>»</a:t>
+              <a:t>tructure »</a:t>
             </a:r>
             <a:endParaRPr lang="fr-FR" dirty="0"/>
           </a:p>
@@ -24022,6 +23994,836 @@
           <a:bodyPr/>
           <a:lstStyle/>
           <a:p>
+            <a:r>
+              <a:rPr lang="fr-FR" dirty="0" smtClean="0"/>
+              <a:t>CHOIX ?</a:t>
+            </a:r>
+            <a:endParaRPr lang="fr-FR" dirty="0"/>
+          </a:p>
+        </p:txBody>
+      </p:sp>
+      <p:sp>
+        <p:nvSpPr>
+          <p:cNvPr id="4" name="Espace réservé du contenu 2"/>
+          <p:cNvSpPr txBox="1">
+            <a:spLocks/>
+          </p:cNvSpPr>
+          <p:nvPr/>
+        </p:nvSpPr>
+        <p:spPr>
+          <a:xfrm>
+            <a:off x="712788" y="3012142"/>
+            <a:ext cx="7716838" cy="3388658"/>
+          </a:xfrm>
+          <a:prstGeom prst="rect">
+            <a:avLst/>
+          </a:prstGeom>
+        </p:spPr>
+        <p:txBody>
+          <a:bodyPr/>
+          <a:lstStyle>
+            <a:lvl1pPr marL="342900" indent="-342900" algn="l" defTabSz="914400" rtl="0" eaLnBrk="1" latinLnBrk="0" hangingPunct="1">
+              <a:spcBef>
+                <a:spcPts val="0"/>
+              </a:spcBef>
+              <a:spcAft>
+                <a:spcPts val="2000"/>
+              </a:spcAft>
+              <a:buFontTx/>
+              <a:buBlip>
+                <a:blip r:embed="rId2"/>
+              </a:buBlip>
+              <a:defRPr sz="2400" kern="1200">
+                <a:solidFill>
+                  <a:schemeClr val="bg1"/>
+                </a:solidFill>
+                <a:effectLst>
+                  <a:outerShdw blurRad="38100" dist="38100" dir="2700000" algn="tl">
+                    <a:srgbClr val="000000">
+                      <a:alpha val="43137"/>
+                    </a:srgbClr>
+                  </a:outerShdw>
+                </a:effectLst>
+                <a:latin typeface="+mn-lt"/>
+                <a:ea typeface="+mn-ea"/>
+                <a:cs typeface="+mn-cs"/>
+              </a:defRPr>
+            </a:lvl1pPr>
+            <a:lvl2pPr marL="631825" indent="-282575" algn="l" defTabSz="914400" rtl="0" eaLnBrk="1" latinLnBrk="0" hangingPunct="1">
+              <a:spcBef>
+                <a:spcPts val="0"/>
+              </a:spcBef>
+              <a:spcAft>
+                <a:spcPts val="1000"/>
+              </a:spcAft>
+              <a:buFontTx/>
+              <a:buBlip>
+                <a:blip r:embed="rId2"/>
+              </a:buBlip>
+              <a:defRPr sz="2200" kern="1200">
+                <a:solidFill>
+                  <a:schemeClr val="bg1"/>
+                </a:solidFill>
+                <a:effectLst>
+                  <a:outerShdw blurRad="38100" dist="38100" dir="2700000" algn="tl">
+                    <a:srgbClr val="000000">
+                      <a:alpha val="43137"/>
+                    </a:srgbClr>
+                  </a:outerShdw>
+                </a:effectLst>
+                <a:latin typeface="+mn-lt"/>
+                <a:ea typeface="+mn-ea"/>
+                <a:cs typeface="+mn-cs"/>
+              </a:defRPr>
+            </a:lvl2pPr>
+            <a:lvl3pPr marL="914400" indent="-282575" algn="l" defTabSz="914400" rtl="0" eaLnBrk="1" latinLnBrk="0" hangingPunct="1">
+              <a:spcBef>
+                <a:spcPts val="0"/>
+              </a:spcBef>
+              <a:spcAft>
+                <a:spcPts val="1000"/>
+              </a:spcAft>
+              <a:buFontTx/>
+              <a:buBlip>
+                <a:blip r:embed="rId2"/>
+              </a:buBlip>
+              <a:defRPr sz="2000" kern="1200">
+                <a:solidFill>
+                  <a:schemeClr val="bg1"/>
+                </a:solidFill>
+                <a:effectLst>
+                  <a:outerShdw blurRad="38100" dist="38100" dir="2700000" algn="tl">
+                    <a:srgbClr val="000000">
+                      <a:alpha val="43137"/>
+                    </a:srgbClr>
+                  </a:outerShdw>
+                </a:effectLst>
+                <a:latin typeface="+mn-lt"/>
+                <a:ea typeface="+mn-ea"/>
+                <a:cs typeface="+mn-cs"/>
+              </a:defRPr>
+            </a:lvl3pPr>
+            <a:lvl4pPr marL="1196975" indent="-282575" algn="l" defTabSz="914400" rtl="0" eaLnBrk="1" latinLnBrk="0" hangingPunct="1">
+              <a:spcBef>
+                <a:spcPts val="0"/>
+              </a:spcBef>
+              <a:spcAft>
+                <a:spcPts val="1000"/>
+              </a:spcAft>
+              <a:buFontTx/>
+              <a:buBlip>
+                <a:blip r:embed="rId2"/>
+              </a:buBlip>
+              <a:defRPr sz="1800" kern="1200">
+                <a:solidFill>
+                  <a:schemeClr val="bg1"/>
+                </a:solidFill>
+                <a:effectLst>
+                  <a:outerShdw blurRad="38100" dist="38100" dir="2700000" algn="tl">
+                    <a:srgbClr val="000000">
+                      <a:alpha val="43137"/>
+                    </a:srgbClr>
+                  </a:outerShdw>
+                </a:effectLst>
+                <a:latin typeface="+mn-lt"/>
+                <a:ea typeface="+mn-ea"/>
+                <a:cs typeface="+mn-cs"/>
+              </a:defRPr>
+            </a:lvl4pPr>
+            <a:lvl5pPr marL="1492250" indent="-295275" algn="l" defTabSz="914400" rtl="0" eaLnBrk="1" latinLnBrk="0" hangingPunct="1">
+              <a:spcBef>
+                <a:spcPts val="0"/>
+              </a:spcBef>
+              <a:spcAft>
+                <a:spcPts val="1000"/>
+              </a:spcAft>
+              <a:buFontTx/>
+              <a:buBlip>
+                <a:blip r:embed="rId2"/>
+              </a:buBlip>
+              <a:defRPr sz="1800" kern="1200">
+                <a:solidFill>
+                  <a:schemeClr val="bg1"/>
+                </a:solidFill>
+                <a:effectLst>
+                  <a:outerShdw blurRad="38100" dist="38100" dir="2700000" algn="tl">
+                    <a:srgbClr val="000000">
+                      <a:alpha val="43137"/>
+                    </a:srgbClr>
+                  </a:outerShdw>
+                </a:effectLst>
+                <a:latin typeface="+mn-lt"/>
+                <a:ea typeface="+mn-ea"/>
+                <a:cs typeface="+mn-cs"/>
+              </a:defRPr>
+            </a:lvl5pPr>
+            <a:lvl6pPr marL="1774825" indent="-288925" algn="l" defTabSz="914400" rtl="0" eaLnBrk="1" latinLnBrk="0" hangingPunct="1">
+              <a:spcBef>
+                <a:spcPts val="0"/>
+              </a:spcBef>
+              <a:spcAft>
+                <a:spcPts val="600"/>
+              </a:spcAft>
+              <a:buFontTx/>
+              <a:buBlip>
+                <a:blip r:embed="rId2"/>
+              </a:buBlip>
+              <a:defRPr lang="en-US" sz="1800" kern="1200" dirty="0" smtClean="0">
+                <a:solidFill>
+                  <a:schemeClr val="bg1"/>
+                </a:solidFill>
+                <a:effectLst>
+                  <a:outerShdw blurRad="38100" dist="38100" dir="2700000" algn="tl">
+                    <a:srgbClr val="000000">
+                      <a:alpha val="43137"/>
+                    </a:srgbClr>
+                  </a:outerShdw>
+                </a:effectLst>
+                <a:latin typeface="+mn-lt"/>
+                <a:ea typeface="+mn-ea"/>
+                <a:cs typeface="+mn-cs"/>
+              </a:defRPr>
+            </a:lvl6pPr>
+            <a:lvl7pPr marL="2055813" indent="-288925" algn="l" defTabSz="914400" rtl="0" eaLnBrk="1" latinLnBrk="0" hangingPunct="1">
+              <a:spcBef>
+                <a:spcPts val="0"/>
+              </a:spcBef>
+              <a:spcAft>
+                <a:spcPts val="600"/>
+              </a:spcAft>
+              <a:buFontTx/>
+              <a:buBlip>
+                <a:blip r:embed="rId2"/>
+              </a:buBlip>
+              <a:defRPr lang="en-US" sz="1800" kern="1200" dirty="0" smtClean="0">
+                <a:solidFill>
+                  <a:schemeClr val="bg1"/>
+                </a:solidFill>
+                <a:effectLst>
+                  <a:outerShdw blurRad="38100" dist="38100" dir="2700000" algn="tl">
+                    <a:srgbClr val="000000">
+                      <a:alpha val="43137"/>
+                    </a:srgbClr>
+                  </a:outerShdw>
+                </a:effectLst>
+                <a:latin typeface="+mn-lt"/>
+                <a:ea typeface="+mn-ea"/>
+                <a:cs typeface="+mn-cs"/>
+              </a:defRPr>
+            </a:lvl7pPr>
+            <a:lvl8pPr marL="2344738" indent="-288925" algn="l" defTabSz="914400" rtl="0" eaLnBrk="1" latinLnBrk="0" hangingPunct="1">
+              <a:spcBef>
+                <a:spcPts val="0"/>
+              </a:spcBef>
+              <a:spcAft>
+                <a:spcPts val="600"/>
+              </a:spcAft>
+              <a:buFontTx/>
+              <a:buBlip>
+                <a:blip r:embed="rId2"/>
+              </a:buBlip>
+              <a:defRPr lang="en-US" sz="1800" kern="1200" dirty="0" smtClean="0">
+                <a:solidFill>
+                  <a:schemeClr val="bg1"/>
+                </a:solidFill>
+                <a:effectLst>
+                  <a:outerShdw blurRad="38100" dist="38100" dir="2700000" algn="tl">
+                    <a:srgbClr val="000000">
+                      <a:alpha val="43137"/>
+                    </a:srgbClr>
+                  </a:outerShdw>
+                </a:effectLst>
+                <a:latin typeface="+mn-lt"/>
+                <a:ea typeface="+mn-ea"/>
+                <a:cs typeface="+mn-cs"/>
+              </a:defRPr>
+            </a:lvl8pPr>
+            <a:lvl9pPr marL="2625725" indent="-288925" algn="l" defTabSz="914400" rtl="0" eaLnBrk="1" latinLnBrk="0" hangingPunct="1">
+              <a:spcBef>
+                <a:spcPts val="0"/>
+              </a:spcBef>
+              <a:spcAft>
+                <a:spcPts val="600"/>
+              </a:spcAft>
+              <a:buFontTx/>
+              <a:buBlip>
+                <a:blip r:embed="rId2"/>
+              </a:buBlip>
+              <a:defRPr lang="en-US" sz="1800" kern="1200" dirty="0">
+                <a:solidFill>
+                  <a:schemeClr val="bg1"/>
+                </a:solidFill>
+                <a:effectLst>
+                  <a:outerShdw blurRad="38100" dist="38100" dir="2700000" algn="tl">
+                    <a:srgbClr val="000000">
+                      <a:alpha val="43137"/>
+                    </a:srgbClr>
+                  </a:outerShdw>
+                </a:effectLst>
+                <a:latin typeface="+mn-lt"/>
+                <a:ea typeface="+mn-ea"/>
+                <a:cs typeface="+mn-cs"/>
+              </a:defRPr>
+            </a:lvl9pPr>
+          </a:lstStyle>
+          <a:p>
+            <a:r>
+              <a:rPr lang="fr-FR" dirty="0" smtClean="0"/>
+              <a:t>iMX53 LOCO</a:t>
+            </a:r>
+          </a:p>
+          <a:p>
+            <a:pPr lvl="1"/>
+            <a:r>
+              <a:rPr lang="fr-FR" dirty="0" smtClean="0"/>
+              <a:t>U-boot </a:t>
+            </a:r>
+            <a:r>
+              <a:rPr lang="fr-FR" dirty="0" err="1" smtClean="0"/>
+              <a:t>dispo</a:t>
+            </a:r>
+            <a:endParaRPr lang="fr-FR" dirty="0" smtClean="0"/>
+          </a:p>
+          <a:p>
+            <a:pPr lvl="1"/>
+            <a:r>
+              <a:rPr lang="fr-FR" dirty="0" err="1" smtClean="0"/>
+              <a:t>Barebox</a:t>
+            </a:r>
+            <a:r>
+              <a:rPr lang="fr-FR" dirty="0" smtClean="0"/>
+              <a:t> </a:t>
+            </a:r>
+            <a:r>
+              <a:rPr lang="fr-FR" dirty="0" err="1" smtClean="0"/>
+              <a:t>dispo</a:t>
+            </a:r>
+            <a:endParaRPr lang="fr-FR" dirty="0" smtClean="0"/>
+          </a:p>
+          <a:p>
+            <a:pPr lvl="1"/>
+            <a:r>
+              <a:rPr lang="fr-FR" dirty="0" smtClean="0"/>
+              <a:t>Kernel </a:t>
+            </a:r>
+            <a:r>
+              <a:rPr lang="fr-FR" dirty="0" err="1" smtClean="0"/>
+              <a:t>mainline</a:t>
+            </a:r>
+            <a:r>
+              <a:rPr lang="fr-FR" dirty="0" smtClean="0"/>
+              <a:t> </a:t>
+            </a:r>
+            <a:r>
+              <a:rPr lang="fr-FR" dirty="0" err="1" smtClean="0"/>
+              <a:t>Dispo</a:t>
+            </a:r>
+            <a:endParaRPr lang="fr-FR" dirty="0" smtClean="0"/>
+          </a:p>
+          <a:p>
+            <a:r>
+              <a:rPr lang="fr-FR" dirty="0" err="1" smtClean="0"/>
+              <a:t>Olimex</a:t>
+            </a:r>
+            <a:r>
+              <a:rPr lang="fr-FR" dirty="0" smtClean="0"/>
+              <a:t> A20 </a:t>
+            </a:r>
+            <a:r>
+              <a:rPr lang="nl-NL" sz="1100" dirty="0">
+                <a:hlinkClick r:id="rId3"/>
+              </a:rPr>
+              <a:t>http://olimex.wordpress.com/2013/09/18/</a:t>
+            </a:r>
+            <a:r>
+              <a:rPr lang="nl-NL" sz="1100">
+                <a:hlinkClick r:id="rId3"/>
+              </a:rPr>
+              <a:t>7795</a:t>
+            </a:r>
+            <a:r>
+              <a:rPr lang="nl-NL" sz="1100" smtClean="0">
+                <a:hlinkClick r:id="rId3"/>
+              </a:rPr>
+              <a:t>/</a:t>
+            </a:r>
+            <a:endParaRPr lang="fr-FR" dirty="0" smtClean="0"/>
+          </a:p>
+          <a:p>
+            <a:pPr lvl="1"/>
+            <a:r>
+              <a:rPr lang="fr-FR" dirty="0" smtClean="0"/>
+              <a:t>Rien de </a:t>
+            </a:r>
+            <a:r>
+              <a:rPr lang="fr-FR" dirty="0" err="1" smtClean="0"/>
+              <a:t>dispo</a:t>
+            </a:r>
+            <a:r>
+              <a:rPr lang="fr-FR" dirty="0" smtClean="0"/>
+              <a:t> en </a:t>
+            </a:r>
+            <a:r>
+              <a:rPr lang="fr-FR" dirty="0" err="1" smtClean="0"/>
+              <a:t>Mainline</a:t>
+            </a:r>
+            <a:r>
+              <a:rPr lang="fr-FR" dirty="0" smtClean="0"/>
+              <a:t> (</a:t>
+            </a:r>
+            <a:r>
+              <a:rPr lang="fr-FR" dirty="0" err="1" smtClean="0"/>
+              <a:t>sunxi</a:t>
+            </a:r>
+            <a:r>
+              <a:rPr lang="fr-FR" dirty="0" smtClean="0"/>
+              <a:t>) par contre peu cher avec un LCDTS </a:t>
+            </a:r>
+          </a:p>
+        </p:txBody>
+      </p:sp>
+    </p:spTree>
+    <p:extLst>
+      <p:ext uri="{BB962C8B-B14F-4D97-AF65-F5344CB8AC3E}">
+        <p14:creationId xmlns:p14="http://schemas.microsoft.com/office/powerpoint/2010/main" val="1716003934"/>
+      </p:ext>
+    </p:extLst>
+  </p:cSld>
+  <p:clrMapOvr>
+    <a:masterClrMapping/>
+  </p:clrMapOvr>
+  <p:timing>
+    <p:tnLst>
+      <p:par>
+        <p:cTn xmlns:p14="http://schemas.microsoft.com/office/powerpoint/2010/main" id="1" dur="indefinite" restart="never" nodeType="tmRoot"/>
+      </p:par>
+    </p:tnLst>
+  </p:timing>
+</p:sld>
+</file>
+
+<file path=ppt/slides/slide31.xml><?xml version="1.0" encoding="utf-8"?>
+<p:sld xmlns:a="http://schemas.openxmlformats.org/drawingml/2006/main" xmlns:r="http://schemas.openxmlformats.org/officeDocument/2006/relationships" xmlns:p="http://schemas.openxmlformats.org/presentationml/2006/main">
+  <p:cSld>
+    <p:spTree>
+      <p:nvGrpSpPr>
+        <p:cNvPr id="1" name=""/>
+        <p:cNvGrpSpPr/>
+        <p:nvPr/>
+      </p:nvGrpSpPr>
+      <p:grpSpPr>
+        <a:xfrm>
+          <a:off x="0" y="0"/>
+          <a:ext cx="0" cy="0"/>
+          <a:chOff x="0" y="0"/>
+          <a:chExt cx="0" cy="0"/>
+        </a:xfrm>
+      </p:grpSpPr>
+      <p:sp>
+        <p:nvSpPr>
+          <p:cNvPr id="2" name="Titre 1"/>
+          <p:cNvSpPr>
+            <a:spLocks noGrp="1"/>
+          </p:cNvSpPr>
+          <p:nvPr>
+            <p:ph type="title"/>
+          </p:nvPr>
+        </p:nvSpPr>
+        <p:spPr/>
+        <p:txBody>
+          <a:bodyPr/>
+          <a:lstStyle/>
+          <a:p>
+            <a:pPr algn="ctr"/>
+            <a:r>
+              <a:rPr lang="fr-FR" dirty="0" err="1" smtClean="0"/>
+              <a:t>Olinuxino</a:t>
+            </a:r>
+            <a:r>
+              <a:rPr lang="fr-FR" dirty="0" smtClean="0"/>
+              <a:t> A20 = </a:t>
+            </a:r>
+            <a:r>
+              <a:rPr lang="fr-FR" smtClean="0"/>
+              <a:t>dev sous git</a:t>
+            </a:r>
+            <a:endParaRPr lang="fr-FR" dirty="0"/>
+          </a:p>
+        </p:txBody>
+      </p:sp>
+      <p:sp>
+        <p:nvSpPr>
+          <p:cNvPr id="4" name="Espace réservé du contenu 2"/>
+          <p:cNvSpPr txBox="1">
+            <a:spLocks/>
+          </p:cNvSpPr>
+          <p:nvPr/>
+        </p:nvSpPr>
+        <p:spPr>
+          <a:xfrm>
+            <a:off x="712788" y="3012142"/>
+            <a:ext cx="7716838" cy="3388658"/>
+          </a:xfrm>
+          <a:prstGeom prst="rect">
+            <a:avLst/>
+          </a:prstGeom>
+        </p:spPr>
+        <p:txBody>
+          <a:bodyPr/>
+          <a:lstStyle>
+            <a:lvl1pPr marL="342900" indent="-342900" algn="l" defTabSz="914400" rtl="0" eaLnBrk="1" latinLnBrk="0" hangingPunct="1">
+              <a:spcBef>
+                <a:spcPts val="0"/>
+              </a:spcBef>
+              <a:spcAft>
+                <a:spcPts val="2000"/>
+              </a:spcAft>
+              <a:buFontTx/>
+              <a:buBlip>
+                <a:blip r:embed="rId2"/>
+              </a:buBlip>
+              <a:defRPr sz="2400" kern="1200">
+                <a:solidFill>
+                  <a:schemeClr val="bg1"/>
+                </a:solidFill>
+                <a:effectLst>
+                  <a:outerShdw blurRad="38100" dist="38100" dir="2700000" algn="tl">
+                    <a:srgbClr val="000000">
+                      <a:alpha val="43137"/>
+                    </a:srgbClr>
+                  </a:outerShdw>
+                </a:effectLst>
+                <a:latin typeface="+mn-lt"/>
+                <a:ea typeface="+mn-ea"/>
+                <a:cs typeface="+mn-cs"/>
+              </a:defRPr>
+            </a:lvl1pPr>
+            <a:lvl2pPr marL="631825" indent="-282575" algn="l" defTabSz="914400" rtl="0" eaLnBrk="1" latinLnBrk="0" hangingPunct="1">
+              <a:spcBef>
+                <a:spcPts val="0"/>
+              </a:spcBef>
+              <a:spcAft>
+                <a:spcPts val="1000"/>
+              </a:spcAft>
+              <a:buFontTx/>
+              <a:buBlip>
+                <a:blip r:embed="rId2"/>
+              </a:buBlip>
+              <a:defRPr sz="2200" kern="1200">
+                <a:solidFill>
+                  <a:schemeClr val="bg1"/>
+                </a:solidFill>
+                <a:effectLst>
+                  <a:outerShdw blurRad="38100" dist="38100" dir="2700000" algn="tl">
+                    <a:srgbClr val="000000">
+                      <a:alpha val="43137"/>
+                    </a:srgbClr>
+                  </a:outerShdw>
+                </a:effectLst>
+                <a:latin typeface="+mn-lt"/>
+                <a:ea typeface="+mn-ea"/>
+                <a:cs typeface="+mn-cs"/>
+              </a:defRPr>
+            </a:lvl2pPr>
+            <a:lvl3pPr marL="914400" indent="-282575" algn="l" defTabSz="914400" rtl="0" eaLnBrk="1" latinLnBrk="0" hangingPunct="1">
+              <a:spcBef>
+                <a:spcPts val="0"/>
+              </a:spcBef>
+              <a:spcAft>
+                <a:spcPts val="1000"/>
+              </a:spcAft>
+              <a:buFontTx/>
+              <a:buBlip>
+                <a:blip r:embed="rId2"/>
+              </a:buBlip>
+              <a:defRPr sz="2000" kern="1200">
+                <a:solidFill>
+                  <a:schemeClr val="bg1"/>
+                </a:solidFill>
+                <a:effectLst>
+                  <a:outerShdw blurRad="38100" dist="38100" dir="2700000" algn="tl">
+                    <a:srgbClr val="000000">
+                      <a:alpha val="43137"/>
+                    </a:srgbClr>
+                  </a:outerShdw>
+                </a:effectLst>
+                <a:latin typeface="+mn-lt"/>
+                <a:ea typeface="+mn-ea"/>
+                <a:cs typeface="+mn-cs"/>
+              </a:defRPr>
+            </a:lvl3pPr>
+            <a:lvl4pPr marL="1196975" indent="-282575" algn="l" defTabSz="914400" rtl="0" eaLnBrk="1" latinLnBrk="0" hangingPunct="1">
+              <a:spcBef>
+                <a:spcPts val="0"/>
+              </a:spcBef>
+              <a:spcAft>
+                <a:spcPts val="1000"/>
+              </a:spcAft>
+              <a:buFontTx/>
+              <a:buBlip>
+                <a:blip r:embed="rId2"/>
+              </a:buBlip>
+              <a:defRPr sz="1800" kern="1200">
+                <a:solidFill>
+                  <a:schemeClr val="bg1"/>
+                </a:solidFill>
+                <a:effectLst>
+                  <a:outerShdw blurRad="38100" dist="38100" dir="2700000" algn="tl">
+                    <a:srgbClr val="000000">
+                      <a:alpha val="43137"/>
+                    </a:srgbClr>
+                  </a:outerShdw>
+                </a:effectLst>
+                <a:latin typeface="+mn-lt"/>
+                <a:ea typeface="+mn-ea"/>
+                <a:cs typeface="+mn-cs"/>
+              </a:defRPr>
+            </a:lvl4pPr>
+            <a:lvl5pPr marL="1492250" indent="-295275" algn="l" defTabSz="914400" rtl="0" eaLnBrk="1" latinLnBrk="0" hangingPunct="1">
+              <a:spcBef>
+                <a:spcPts val="0"/>
+              </a:spcBef>
+              <a:spcAft>
+                <a:spcPts val="1000"/>
+              </a:spcAft>
+              <a:buFontTx/>
+              <a:buBlip>
+                <a:blip r:embed="rId2"/>
+              </a:buBlip>
+              <a:defRPr sz="1800" kern="1200">
+                <a:solidFill>
+                  <a:schemeClr val="bg1"/>
+                </a:solidFill>
+                <a:effectLst>
+                  <a:outerShdw blurRad="38100" dist="38100" dir="2700000" algn="tl">
+                    <a:srgbClr val="000000">
+                      <a:alpha val="43137"/>
+                    </a:srgbClr>
+                  </a:outerShdw>
+                </a:effectLst>
+                <a:latin typeface="+mn-lt"/>
+                <a:ea typeface="+mn-ea"/>
+                <a:cs typeface="+mn-cs"/>
+              </a:defRPr>
+            </a:lvl5pPr>
+            <a:lvl6pPr marL="1774825" indent="-288925" algn="l" defTabSz="914400" rtl="0" eaLnBrk="1" latinLnBrk="0" hangingPunct="1">
+              <a:spcBef>
+                <a:spcPts val="0"/>
+              </a:spcBef>
+              <a:spcAft>
+                <a:spcPts val="600"/>
+              </a:spcAft>
+              <a:buFontTx/>
+              <a:buBlip>
+                <a:blip r:embed="rId2"/>
+              </a:buBlip>
+              <a:defRPr lang="en-US" sz="1800" kern="1200" dirty="0" smtClean="0">
+                <a:solidFill>
+                  <a:schemeClr val="bg1"/>
+                </a:solidFill>
+                <a:effectLst>
+                  <a:outerShdw blurRad="38100" dist="38100" dir="2700000" algn="tl">
+                    <a:srgbClr val="000000">
+                      <a:alpha val="43137"/>
+                    </a:srgbClr>
+                  </a:outerShdw>
+                </a:effectLst>
+                <a:latin typeface="+mn-lt"/>
+                <a:ea typeface="+mn-ea"/>
+                <a:cs typeface="+mn-cs"/>
+              </a:defRPr>
+            </a:lvl6pPr>
+            <a:lvl7pPr marL="2055813" indent="-288925" algn="l" defTabSz="914400" rtl="0" eaLnBrk="1" latinLnBrk="0" hangingPunct="1">
+              <a:spcBef>
+                <a:spcPts val="0"/>
+              </a:spcBef>
+              <a:spcAft>
+                <a:spcPts val="600"/>
+              </a:spcAft>
+              <a:buFontTx/>
+              <a:buBlip>
+                <a:blip r:embed="rId2"/>
+              </a:buBlip>
+              <a:defRPr lang="en-US" sz="1800" kern="1200" dirty="0" smtClean="0">
+                <a:solidFill>
+                  <a:schemeClr val="bg1"/>
+                </a:solidFill>
+                <a:effectLst>
+                  <a:outerShdw blurRad="38100" dist="38100" dir="2700000" algn="tl">
+                    <a:srgbClr val="000000">
+                      <a:alpha val="43137"/>
+                    </a:srgbClr>
+                  </a:outerShdw>
+                </a:effectLst>
+                <a:latin typeface="+mn-lt"/>
+                <a:ea typeface="+mn-ea"/>
+                <a:cs typeface="+mn-cs"/>
+              </a:defRPr>
+            </a:lvl7pPr>
+            <a:lvl8pPr marL="2344738" indent="-288925" algn="l" defTabSz="914400" rtl="0" eaLnBrk="1" latinLnBrk="0" hangingPunct="1">
+              <a:spcBef>
+                <a:spcPts val="0"/>
+              </a:spcBef>
+              <a:spcAft>
+                <a:spcPts val="600"/>
+              </a:spcAft>
+              <a:buFontTx/>
+              <a:buBlip>
+                <a:blip r:embed="rId2"/>
+              </a:buBlip>
+              <a:defRPr lang="en-US" sz="1800" kern="1200" dirty="0" smtClean="0">
+                <a:solidFill>
+                  <a:schemeClr val="bg1"/>
+                </a:solidFill>
+                <a:effectLst>
+                  <a:outerShdw blurRad="38100" dist="38100" dir="2700000" algn="tl">
+                    <a:srgbClr val="000000">
+                      <a:alpha val="43137"/>
+                    </a:srgbClr>
+                  </a:outerShdw>
+                </a:effectLst>
+                <a:latin typeface="+mn-lt"/>
+                <a:ea typeface="+mn-ea"/>
+                <a:cs typeface="+mn-cs"/>
+              </a:defRPr>
+            </a:lvl8pPr>
+            <a:lvl9pPr marL="2625725" indent="-288925" algn="l" defTabSz="914400" rtl="0" eaLnBrk="1" latinLnBrk="0" hangingPunct="1">
+              <a:spcBef>
+                <a:spcPts val="0"/>
+              </a:spcBef>
+              <a:spcAft>
+                <a:spcPts val="600"/>
+              </a:spcAft>
+              <a:buFontTx/>
+              <a:buBlip>
+                <a:blip r:embed="rId2"/>
+              </a:buBlip>
+              <a:defRPr lang="en-US" sz="1800" kern="1200" dirty="0">
+                <a:solidFill>
+                  <a:schemeClr val="bg1"/>
+                </a:solidFill>
+                <a:effectLst>
+                  <a:outerShdw blurRad="38100" dist="38100" dir="2700000" algn="tl">
+                    <a:srgbClr val="000000">
+                      <a:alpha val="43137"/>
+                    </a:srgbClr>
+                  </a:outerShdw>
+                </a:effectLst>
+                <a:latin typeface="+mn-lt"/>
+                <a:ea typeface="+mn-ea"/>
+                <a:cs typeface="+mn-cs"/>
+              </a:defRPr>
+            </a:lvl9pPr>
+          </a:lstStyle>
+          <a:p>
+            <a:r>
+              <a:rPr lang="fr-FR" dirty="0" smtClean="0"/>
+              <a:t>Kernel 3.4</a:t>
+            </a:r>
+          </a:p>
+          <a:p>
+            <a:r>
+              <a:rPr lang="fr-FR" dirty="0" err="1" smtClean="0"/>
+              <a:t>U</a:t>
+            </a:r>
+            <a:r>
+              <a:rPr lang="fr-FR" dirty="0" err="1" smtClean="0"/>
+              <a:t>boot</a:t>
+            </a:r>
+            <a:r>
+              <a:rPr lang="fr-FR" dirty="0" smtClean="0"/>
+              <a:t> </a:t>
+            </a:r>
+            <a:r>
+              <a:rPr lang="fr-FR" dirty="0" smtClean="0">
+                <a:sym typeface="Wingdings"/>
+              </a:rPr>
+              <a:t> </a:t>
+            </a:r>
+            <a:r>
+              <a:rPr lang="fr-FR" dirty="0" err="1" smtClean="0">
+                <a:sym typeface="Wingdings"/>
+              </a:rPr>
+              <a:t>sunxi</a:t>
+            </a:r>
+            <a:endParaRPr lang="fr-FR" dirty="0" smtClean="0">
+              <a:sym typeface="Wingdings"/>
+            </a:endParaRPr>
+          </a:p>
+          <a:p>
+            <a:r>
+              <a:rPr lang="fr-FR" dirty="0" smtClean="0">
+                <a:sym typeface="Wingdings"/>
+              </a:rPr>
+              <a:t>Kernel  </a:t>
+            </a:r>
+            <a:r>
+              <a:rPr lang="fr-FR" dirty="0" err="1" smtClean="0">
+                <a:sym typeface="Wingdings"/>
+              </a:rPr>
+              <a:t>sunxi</a:t>
+            </a:r>
+            <a:endParaRPr lang="fr-FR" dirty="0" smtClean="0">
+              <a:sym typeface="Wingdings"/>
+            </a:endParaRPr>
+          </a:p>
+          <a:p>
+            <a:pPr lvl="1"/>
+            <a:r>
+              <a:rPr lang="fr-FR" dirty="0" smtClean="0">
+                <a:sym typeface="Wingdings"/>
+              </a:rPr>
+              <a:t>sun7i_defconfig</a:t>
+            </a:r>
+            <a:endParaRPr lang="fr-FR" dirty="0" smtClean="0"/>
+          </a:p>
+        </p:txBody>
+      </p:sp>
+    </p:spTree>
+    <p:extLst>
+      <p:ext uri="{BB962C8B-B14F-4D97-AF65-F5344CB8AC3E}">
+        <p14:creationId xmlns:p14="http://schemas.microsoft.com/office/powerpoint/2010/main" val="713090099"/>
+      </p:ext>
+    </p:extLst>
+  </p:cSld>
+  <p:clrMapOvr>
+    <a:masterClrMapping/>
+  </p:clrMapOvr>
+</p:sld>
+</file>
+
+<file path=ppt/slides/slide32.xml><?xml version="1.0" encoding="utf-8"?>
+<p:sld xmlns:a="http://schemas.openxmlformats.org/drawingml/2006/main" xmlns:r="http://schemas.openxmlformats.org/officeDocument/2006/relationships" xmlns:p="http://schemas.openxmlformats.org/presentationml/2006/main">
+  <p:cSld>
+    <p:spTree>
+      <p:nvGrpSpPr>
+        <p:cNvPr id="1" name=""/>
+        <p:cNvGrpSpPr/>
+        <p:nvPr/>
+      </p:nvGrpSpPr>
+      <p:grpSpPr>
+        <a:xfrm>
+          <a:off x="0" y="0"/>
+          <a:ext cx="0" cy="0"/>
+          <a:chOff x="0" y="0"/>
+          <a:chExt cx="0" cy="0"/>
+        </a:xfrm>
+      </p:grpSpPr>
+      <p:sp>
+        <p:nvSpPr>
+          <p:cNvPr id="2" name="Titre 1"/>
+          <p:cNvSpPr>
+            <a:spLocks noGrp="1"/>
+          </p:cNvSpPr>
+          <p:nvPr>
+            <p:ph type="title"/>
+          </p:nvPr>
+        </p:nvSpPr>
+        <p:spPr/>
+        <p:txBody>
+          <a:bodyPr/>
+          <a:lstStyle/>
+          <a:p>
             <a:pPr algn="ctr"/>
             <a:r>
               <a:rPr lang="fr-FR" dirty="0" smtClean="0"/>
@@ -24069,6 +24871,142 @@
   <p:clrMapOvr>
     <a:masterClrMapping/>
   </p:clrMapOvr>
+  <p:timing>
+    <p:tnLst>
+      <p:par>
+        <p:cTn xmlns:p14="http://schemas.microsoft.com/office/powerpoint/2010/main" id="1" dur="indefinite" restart="never" nodeType="tmRoot"/>
+      </p:par>
+    </p:tnLst>
+  </p:timing>
+</p:sld>
+</file>
+
+<file path=ppt/slides/slide33.xml><?xml version="1.0" encoding="utf-8"?>
+<p:sld xmlns:a="http://schemas.openxmlformats.org/drawingml/2006/main" xmlns:r="http://schemas.openxmlformats.org/officeDocument/2006/relationships" xmlns:p="http://schemas.openxmlformats.org/presentationml/2006/main">
+  <p:cSld>
+    <p:spTree>
+      <p:nvGrpSpPr>
+        <p:cNvPr id="1" name=""/>
+        <p:cNvGrpSpPr/>
+        <p:nvPr/>
+      </p:nvGrpSpPr>
+      <p:grpSpPr>
+        <a:xfrm>
+          <a:off x="0" y="0"/>
+          <a:ext cx="0" cy="0"/>
+          <a:chOff x="0" y="0"/>
+          <a:chExt cx="0" cy="0"/>
+        </a:xfrm>
+      </p:grpSpPr>
+      <p:sp>
+        <p:nvSpPr>
+          <p:cNvPr id="2" name="Titre 1"/>
+          <p:cNvSpPr>
+            <a:spLocks noGrp="1"/>
+          </p:cNvSpPr>
+          <p:nvPr>
+            <p:ph type="title"/>
+          </p:nvPr>
+        </p:nvSpPr>
+        <p:spPr/>
+        <p:txBody>
+          <a:bodyPr/>
+          <a:lstStyle/>
+          <a:p>
+            <a:r>
+              <a:rPr lang="fr-FR" dirty="0" smtClean="0"/>
+              <a:t>Drone</a:t>
+            </a:r>
+            <a:endParaRPr lang="fr-FR" dirty="0"/>
+          </a:p>
+        </p:txBody>
+      </p:sp>
+      <p:sp>
+        <p:nvSpPr>
+          <p:cNvPr id="5" name="Espace réservé du contenu 4"/>
+          <p:cNvSpPr>
+            <a:spLocks noGrp="1"/>
+          </p:cNvSpPr>
+          <p:nvPr>
+            <p:ph idx="1"/>
+          </p:nvPr>
+        </p:nvSpPr>
+        <p:spPr/>
+        <p:txBody>
+          <a:bodyPr>
+            <a:normAutofit fontScale="85000" lnSpcReduction="20000"/>
+          </a:bodyPr>
+          <a:lstStyle/>
+          <a:p>
+            <a:r>
+              <a:rPr lang="fr-FR" dirty="0" smtClean="0"/>
+              <a:t>Secteur : Commercialiser une solution drone a de clients finaux</a:t>
+            </a:r>
+          </a:p>
+          <a:p>
+            <a:endParaRPr lang="fr-FR" dirty="0"/>
+          </a:p>
+          <a:p>
+            <a:r>
+              <a:rPr lang="fr-FR" dirty="0" smtClean="0">
+                <a:sym typeface="Wingdings"/>
+              </a:rPr>
+              <a:t> ergonomie avancée </a:t>
+            </a:r>
+          </a:p>
+          <a:p>
+            <a:endParaRPr lang="fr-FR" dirty="0">
+              <a:sym typeface="Wingdings"/>
+            </a:endParaRPr>
+          </a:p>
+          <a:p>
+            <a:r>
+              <a:rPr lang="fr-FR" dirty="0" smtClean="0">
+                <a:sym typeface="Wingdings"/>
+              </a:rPr>
+              <a:t>R</a:t>
+            </a:r>
+            <a:r>
+              <a:rPr lang="fr-FR" dirty="0" smtClean="0">
+                <a:sym typeface="Wingdings"/>
+              </a:rPr>
+              <a:t>ôle = Améliorer l’usage du drone</a:t>
+            </a:r>
+          </a:p>
+          <a:p>
+            <a:r>
+              <a:rPr lang="fr-FR" dirty="0" smtClean="0">
+                <a:sym typeface="Wingdings"/>
+              </a:rPr>
+              <a:t>DIY</a:t>
+            </a:r>
+            <a:endParaRPr lang="fr-FR" dirty="0" smtClean="0"/>
+          </a:p>
+          <a:p>
+            <a:endParaRPr lang="fr-FR" dirty="0"/>
+          </a:p>
+          <a:p>
+            <a:endParaRPr lang="fr-FR" dirty="0"/>
+          </a:p>
+        </p:txBody>
+      </p:sp>
+    </p:spTree>
+    <p:extLst>
+      <p:ext uri="{BB962C8B-B14F-4D97-AF65-F5344CB8AC3E}">
+        <p14:creationId xmlns:p14="http://schemas.microsoft.com/office/powerpoint/2010/main" val="2726402853"/>
+      </p:ext>
+    </p:extLst>
+  </p:cSld>
+  <p:clrMapOvr>
+    <a:masterClrMapping/>
+  </p:clrMapOvr>
+  <p:timing>
+    <p:tnLst>
+      <p:par>
+        <p:cTn xmlns:p14="http://schemas.microsoft.com/office/powerpoint/2010/main" id="1" dur="indefinite" restart="never" nodeType="tmRoot"/>
+      </p:par>
+    </p:tnLst>
+  </p:timing>
 </p:sld>
 </file>
 
@@ -24431,50 +25369,6 @@
           <a:chExt cx="0" cy="0"/>
         </a:xfrm>
       </p:grpSpPr>
-      <p:sp>
-        <p:nvSpPr>
-          <p:cNvPr id="22" name="Rectangle 21"/>
-          <p:cNvSpPr/>
-          <p:nvPr/>
-        </p:nvSpPr>
-        <p:spPr>
-          <a:xfrm>
-            <a:off x="324556" y="2875844"/>
-            <a:ext cx="8650111" cy="3770489"/>
-          </a:xfrm>
-          <a:prstGeom prst="rect">
-            <a:avLst/>
-          </a:prstGeom>
-          <a:solidFill>
-            <a:schemeClr val="bg2">
-              <a:lumMod val="40000"/>
-              <a:lumOff val="60000"/>
-            </a:schemeClr>
-          </a:solidFill>
-        </p:spPr>
-        <p:style>
-          <a:lnRef idx="1">
-            <a:schemeClr val="accent1"/>
-          </a:lnRef>
-          <a:fillRef idx="3">
-            <a:schemeClr val="accent1"/>
-          </a:fillRef>
-          <a:effectRef idx="2">
-            <a:schemeClr val="accent1"/>
-          </a:effectRef>
-          <a:fontRef idx="minor">
-            <a:schemeClr val="lt1"/>
-          </a:fontRef>
-        </p:style>
-        <p:txBody>
-          <a:bodyPr rtlCol="0" anchor="ctr"/>
-          <a:lstStyle/>
-          <a:p>
-            <a:pPr algn="ctr"/>
-            <a:endParaRPr lang="fr-FR"/>
-          </a:p>
-        </p:txBody>
-      </p:sp>
       <p:cxnSp>
         <p:nvCxnSpPr>
           <p:cNvPr id="12" name="Connecteur droit 11"/>

</xml_diff>